<commit_message>
modify files based on reviwer comments
</commit_message>
<xml_diff>
--- a/securing_recipe_vault/submission/final/DevOpsPipeline.pptx
+++ b/securing_recipe_vault/submission/final/DevOpsPipeline.pptx
@@ -5652,10 +5652,9 @@
               <a:buNone/>
             </a:pPr>
             <a:r>
-              <a:rPr lang="en" sz="1000"/>
+              <a:rPr lang="en" sz="1000" dirty="0"/>
               <a:t>Deploy cloud configuration or application to environment</a:t>
             </a:r>
-            <a:endParaRPr sz="1000"/>
           </a:p>
         </p:txBody>
       </p:sp>
@@ -5962,8 +5961,24 @@
             </a:pPr>
             <a:r>
               <a:rPr lang="en-US" sz="1000" dirty="0"/>
-              <a:t>Infrastructure as code compliance scanning</a:t>
+              <a:t>Infrastructure as code compliance scanning with </a:t>
             </a:r>
+          </a:p>
+          <a:p>
+            <a:pPr marL="0" lvl="0" indent="0" algn="ctr" rtl="0">
+              <a:spcBef>
+                <a:spcPts val="0"/>
+              </a:spcBef>
+              <a:spcAft>
+                <a:spcPts val="0"/>
+              </a:spcAft>
+              <a:buNone/>
+            </a:pPr>
+            <a:r>
+              <a:rPr lang="en-US" sz="1000" dirty="0" err="1"/>
+              <a:t>TFlint</a:t>
+            </a:r>
+            <a:endParaRPr lang="en-US" sz="1000" dirty="0"/>
           </a:p>
         </p:txBody>
       </p:sp>
@@ -6047,6 +6062,29 @@
             <a:r>
               <a:rPr lang="en-US" sz="1000" dirty="0"/>
               <a:t>AMI or container image scanning</a:t>
+            </a:r>
+          </a:p>
+          <a:p>
+            <a:pPr marL="0" lvl="0" indent="0" algn="ctr" rtl="0">
+              <a:spcBef>
+                <a:spcPts val="0"/>
+              </a:spcBef>
+              <a:spcAft>
+                <a:spcPts val="0"/>
+              </a:spcAft>
+              <a:buNone/>
+            </a:pPr>
+            <a:r>
+              <a:rPr lang="en-US" altLang="zh-CN" sz="1000" dirty="0"/>
+              <a:t>with</a:t>
+            </a:r>
+            <a:r>
+              <a:rPr lang="zh-CN" altLang="en-US" sz="1000" dirty="0"/>
+              <a:t> </a:t>
+            </a:r>
+            <a:r>
+              <a:rPr lang="en-US" altLang="zh-CN" sz="1000" dirty="0"/>
+              <a:t>Qualys</a:t>
             </a:r>
             <a:endParaRPr sz="1000" dirty="0"/>
           </a:p>
@@ -6121,20 +6159,15 @@
           </a:bodyPr>
           <a:lstStyle/>
           <a:p>
-            <a:pPr marL="0" lvl="0" indent="0" algn="ctr" rtl="0">
-              <a:spcBef>
-                <a:spcPts val="0"/>
-              </a:spcBef>
-              <a:spcAft>
-                <a:spcPts val="0"/>
-              </a:spcAft>
-              <a:buNone/>
-            </a:pPr>
+            <a:pPr algn="ctr"/>
             <a:r>
               <a:rPr lang="en" sz="1000" dirty="0"/>
-              <a:t>Post-deployment compliance scanning</a:t>
+              <a:t>Post-deployment compliance scanning </a:t>
             </a:r>
-            <a:endParaRPr sz="1000" dirty="0"/>
+            <a:r>
+              <a:rPr lang="en-US" sz="1000" dirty="0"/>
+              <a:t>with Amazon inspector</a:t>
+            </a:r>
           </a:p>
         </p:txBody>
       </p:sp>

</xml_diff>